<commit_message>
want instead of need. Subtle but significant difference in tone
</commit_message>
<xml_diff>
--- a/OctopusDeployFundamentals/Module3-DeploymentProjects/Slides/Module3Class1-Projects.pptx
+++ b/OctopusDeployFundamentals/Module3-DeploymentProjects/Slides/Module3Class1-Projects.pptx
@@ -2513,7 +2513,27 @@
                 <a:effectLst/>
                 <a:latin typeface="Consolas" panose="020B0609020204030204" pitchFamily="49" charset="0"/>
               </a:rPr>
-              <a:t> of every part of the system. If the website updates are automated through Octopus, but deployments are regularly blocked on manual database updates, you'll need to automate the database steps to unleash Octopus's full potential.</a:t>
+              <a:t> of every part of the system. If the website updates are automated through Octopus, but deployments are regularly blocked on manual database updates, </a:t>
+            </a:r>
+            <a:r>
+              <a:rPr lang="en-GB" b="0">
+                <a:solidFill>
+                  <a:srgbClr val="D4D4D4"/>
+                </a:solidFill>
+                <a:effectLst/>
+                <a:latin typeface="Consolas" panose="020B0609020204030204" pitchFamily="49" charset="0"/>
+              </a:rPr>
+              <a:t>you’ll want </a:t>
+            </a:r>
+            <a:r>
+              <a:rPr lang="en-GB" b="0" dirty="0">
+                <a:solidFill>
+                  <a:srgbClr val="D4D4D4"/>
+                </a:solidFill>
+                <a:effectLst/>
+                <a:latin typeface="Consolas" panose="020B0609020204030204" pitchFamily="49" charset="0"/>
+              </a:rPr>
+              <a:t>to automate the database steps to unleash Octopus's full potential.</a:t>
             </a:r>
           </a:p>
           <a:p>
@@ -7366,13 +7386,13 @@
   <p:clrMapOvr>
     <a:masterClrMapping/>
   </p:clrMapOvr>
-  <mc:AlternateContent xmlns:mc="http://schemas.openxmlformats.org/markup-compatibility/2006">
-    <mc:Choice xmlns:p14="http://schemas.microsoft.com/office/powerpoint/2010/main" Requires="p14">
+  <mc:AlternateContent xmlns:mc="http://schemas.openxmlformats.org/markup-compatibility/2006" xmlns:p14="http://schemas.microsoft.com/office/powerpoint/2010/main">
+    <mc:Choice Requires="p14">
       <p:transition spd="med" p14:dur="700">
         <p:fade/>
       </p:transition>
     </mc:Choice>
-    <mc:Fallback>
+    <mc:Fallback xmlns="">
       <p:transition spd="med">
         <p:fade/>
       </p:transition>
@@ -7464,13 +7484,13 @@
   <p:clrMapOvr>
     <a:masterClrMapping/>
   </p:clrMapOvr>
-  <mc:AlternateContent xmlns:mc="http://schemas.openxmlformats.org/markup-compatibility/2006">
-    <mc:Choice xmlns:p14="http://schemas.microsoft.com/office/powerpoint/2010/main" Requires="p14">
+  <mc:AlternateContent xmlns:mc="http://schemas.openxmlformats.org/markup-compatibility/2006" xmlns:p14="http://schemas.microsoft.com/office/powerpoint/2010/main">
+    <mc:Choice Requires="p14">
       <p:transition spd="med" p14:dur="700">
         <p:fade/>
       </p:transition>
     </mc:Choice>
-    <mc:Fallback>
+    <mc:Fallback xmlns="">
       <p:transition spd="med">
         <p:fade/>
       </p:transition>
@@ -7771,13 +7791,13 @@
   <p:clrMapOvr>
     <a:masterClrMapping/>
   </p:clrMapOvr>
-  <mc:AlternateContent xmlns:mc="http://schemas.openxmlformats.org/markup-compatibility/2006">
-    <mc:Choice xmlns:p14="http://schemas.microsoft.com/office/powerpoint/2010/main" Requires="p14">
+  <mc:AlternateContent xmlns:mc="http://schemas.openxmlformats.org/markup-compatibility/2006" xmlns:p14="http://schemas.microsoft.com/office/powerpoint/2010/main">
+    <mc:Choice Requires="p14">
       <p:transition spd="med" p14:dur="700">
         <p:fade/>
       </p:transition>
     </mc:Choice>
-    <mc:Fallback>
+    <mc:Fallback xmlns="">
       <p:transition spd="med">
         <p:fade/>
       </p:transition>

</xml_diff>

<commit_message>
Adding slides for mod 3 classes 2-4
</commit_message>
<xml_diff>
--- a/OctopusDeployFundamentals/Module3-DeploymentProjects/Slides/Module3Class1-Projects.pptx
+++ b/OctopusDeployFundamentals/Module3-DeploymentProjects/Slides/Module3Class1-Projects.pptx
@@ -9961,8 +9961,13 @@
             </a:pPr>
             <a:r>
               <a:rPr lang="en-GB" sz="2400" dirty="0"/>
-              <a:t>Break up big projects</a:t>
+              <a:t>Break up </a:t>
             </a:r>
+            <a:r>
+              <a:rPr lang="en-GB" sz="2400"/>
+              <a:t>big Projects</a:t>
+            </a:r>
+            <a:endParaRPr lang="en-GB" sz="2400" dirty="0"/>
           </a:p>
         </p:txBody>
       </p:sp>

</xml_diff>

<commit_message>
Tweaks to script during recording
</commit_message>
<xml_diff>
--- a/OctopusDeployFundamentals/Module3-DeploymentProjects/Slides/Module3Class1-Projects.pptx
+++ b/OctopusDeployFundamentals/Module3-DeploymentProjects/Slides/Module3Class1-Projects.pptx
@@ -2175,7 +2175,7 @@
                 <a:effectLst/>
                 <a:latin typeface="Consolas" panose="020B0609020204030204" pitchFamily="49" charset="0"/>
               </a:rPr>
-              <a:t>Navigate to the Projects page in the Octopus Deploy interface and click "ADD GROUP", enter a name and click "SAVE".</a:t>
+              <a:t>Navigate to the Projects page in the Octopus Deploy interface and click "ADD GROUP", enter a name and a description.</a:t>
             </a:r>
           </a:p>
           <a:p>
@@ -2223,7 +2223,31 @@
                 <a:effectLst/>
                 <a:latin typeface="Consolas" panose="020B0609020204030204" pitchFamily="49" charset="0"/>
               </a:rPr>
-              <a:t>Now click "ADD PROJECT", provide a name for this component, and click "SAVE". You've just created your first project.</a:t>
+              <a:t>The description supports markdown, allowing us to add relevant hyperlinks, such as the source code, build server, documentation pages or whatever else may be useful to Project maintainers.</a:t>
+            </a:r>
+          </a:p>
+          <a:p>
+            <a:pPr marL="158750" indent="0">
+              <a:buNone/>
+            </a:pPr>
+            <a:br>
+              <a:rPr lang="en-GB" b="0" dirty="0">
+                <a:solidFill>
+                  <a:srgbClr val="D4D4D4"/>
+                </a:solidFill>
+                <a:effectLst/>
+                <a:latin typeface="Consolas" panose="020B0609020204030204" pitchFamily="49" charset="0"/>
+              </a:rPr>
+            </a:br>
+            <a:r>
+              <a:rPr lang="en-GB" b="0" dirty="0">
+                <a:solidFill>
+                  <a:srgbClr val="D4D4D4"/>
+                </a:solidFill>
+                <a:effectLst/>
+                <a:latin typeface="Consolas" panose="020B0609020204030204" pitchFamily="49" charset="0"/>
+              </a:rPr>
+              <a:t>Now let's add a Project to our Project Group, provide a name, and click "SAVE". You've just created your first project.</a:t>
             </a:r>
           </a:p>
           <a:p>
@@ -2271,7 +2295,7 @@
                 <a:effectLst/>
                 <a:latin typeface="Consolas" panose="020B0609020204030204" pitchFamily="49" charset="0"/>
               </a:rPr>
-              <a:t>Let's start by reviewing the settings for our Project.</a:t>
+              <a:t>Let's review the settings for our Project.</a:t>
             </a:r>
           </a:p>
           <a:p>
@@ -2295,7 +2319,7 @@
                 <a:effectLst/>
                 <a:latin typeface="Consolas" panose="020B0609020204030204" pitchFamily="49" charset="0"/>
               </a:rPr>
-              <a:t>On the settings page we can upload a logo for the Project, and enter a description. The description supports markdown, allowing us to add relevant hyperlinks, such as the source code, build server, documentation pages or whatever else may be useful to Project maintainers.</a:t>
+              <a:t>On the settings page we can upload a logo for the Project, and enter a description. </a:t>
             </a:r>
           </a:p>
           <a:p>
@@ -2323,6 +2347,9 @@
             </a:r>
           </a:p>
           <a:p>
+            <a:pPr marL="158750" indent="0">
+              <a:buNone/>
+            </a:pPr>
             <a:endParaRPr lang="en-GB" dirty="0"/>
           </a:p>
         </p:txBody>

</xml_diff>